<commit_message>
sec-experiment improved and stack-rel.png added
</commit_message>
<xml_diff>
--- a/data/Diagrams.pptx
+++ b/data/Diagrams.pptx
@@ -10,6 +10,7 @@
     <p:sldId id="262" r:id="rId4"/>
     <p:sldId id="260" r:id="rId5"/>
     <p:sldId id="261" r:id="rId6"/>
+    <p:sldId id="263" r:id="rId7"/>
   </p:sldIdLst>
   <p:sldSz cx="9144000" cy="6858000" type="screen4x3"/>
   <p:notesSz cx="6858000" cy="9144000"/>
@@ -292,7 +293,7 @@
           <a:p>
             <a:fld id="{FD09FB90-A83B-E248-A89C-4D42C06EC9BD}" type="datetimeFigureOut">
               <a:rPr lang="en-US" smtClean="0"/>
-              <a:t>11/03/15</a:t>
+              <a:t>16/03/15</a:t>
             </a:fld>
             <a:endParaRPr lang="en-US"/>
           </a:p>
@@ -457,7 +458,7 @@
           <a:p>
             <a:fld id="{FD09FB90-A83B-E248-A89C-4D42C06EC9BD}" type="datetimeFigureOut">
               <a:rPr lang="en-US" smtClean="0"/>
-              <a:t>11/03/15</a:t>
+              <a:t>16/03/15</a:t>
             </a:fld>
             <a:endParaRPr lang="en-US"/>
           </a:p>
@@ -632,7 +633,7 @@
           <a:p>
             <a:fld id="{FD09FB90-A83B-E248-A89C-4D42C06EC9BD}" type="datetimeFigureOut">
               <a:rPr lang="en-US" smtClean="0"/>
-              <a:t>11/03/15</a:t>
+              <a:t>16/03/15</a:t>
             </a:fld>
             <a:endParaRPr lang="en-US"/>
           </a:p>
@@ -797,7 +798,7 @@
           <a:p>
             <a:fld id="{FD09FB90-A83B-E248-A89C-4D42C06EC9BD}" type="datetimeFigureOut">
               <a:rPr lang="en-US" smtClean="0"/>
-              <a:t>11/03/15</a:t>
+              <a:t>16/03/15</a:t>
             </a:fld>
             <a:endParaRPr lang="en-US"/>
           </a:p>
@@ -1038,7 +1039,7 @@
           <a:p>
             <a:fld id="{FD09FB90-A83B-E248-A89C-4D42C06EC9BD}" type="datetimeFigureOut">
               <a:rPr lang="en-US" smtClean="0"/>
-              <a:t>11/03/15</a:t>
+              <a:t>16/03/15</a:t>
             </a:fld>
             <a:endParaRPr lang="en-US"/>
           </a:p>
@@ -1321,7 +1322,7 @@
           <a:p>
             <a:fld id="{FD09FB90-A83B-E248-A89C-4D42C06EC9BD}" type="datetimeFigureOut">
               <a:rPr lang="en-US" smtClean="0"/>
-              <a:t>11/03/15</a:t>
+              <a:t>16/03/15</a:t>
             </a:fld>
             <a:endParaRPr lang="en-US"/>
           </a:p>
@@ -1738,7 +1739,7 @@
           <a:p>
             <a:fld id="{FD09FB90-A83B-E248-A89C-4D42C06EC9BD}" type="datetimeFigureOut">
               <a:rPr lang="en-US" smtClean="0"/>
-              <a:t>11/03/15</a:t>
+              <a:t>16/03/15</a:t>
             </a:fld>
             <a:endParaRPr lang="en-US"/>
           </a:p>
@@ -1851,7 +1852,7 @@
           <a:p>
             <a:fld id="{FD09FB90-A83B-E248-A89C-4D42C06EC9BD}" type="datetimeFigureOut">
               <a:rPr lang="en-US" smtClean="0"/>
-              <a:t>11/03/15</a:t>
+              <a:t>16/03/15</a:t>
             </a:fld>
             <a:endParaRPr lang="en-US"/>
           </a:p>
@@ -1941,7 +1942,7 @@
           <a:p>
             <a:fld id="{FD09FB90-A83B-E248-A89C-4D42C06EC9BD}" type="datetimeFigureOut">
               <a:rPr lang="en-US" smtClean="0"/>
-              <a:t>11/03/15</a:t>
+              <a:t>16/03/15</a:t>
             </a:fld>
             <a:endParaRPr lang="en-US"/>
           </a:p>
@@ -2213,7 +2214,7 @@
           <a:p>
             <a:fld id="{FD09FB90-A83B-E248-A89C-4D42C06EC9BD}" type="datetimeFigureOut">
               <a:rPr lang="en-US" smtClean="0"/>
-              <a:t>11/03/15</a:t>
+              <a:t>16/03/15</a:t>
             </a:fld>
             <a:endParaRPr lang="en-US"/>
           </a:p>
@@ -2461,7 +2462,7 @@
           <a:p>
             <a:fld id="{FD09FB90-A83B-E248-A89C-4D42C06EC9BD}" type="datetimeFigureOut">
               <a:rPr lang="en-US" smtClean="0"/>
-              <a:t>11/03/15</a:t>
+              <a:t>16/03/15</a:t>
             </a:fld>
             <a:endParaRPr lang="en-US"/>
           </a:p>
@@ -2669,7 +2670,7 @@
           <a:p>
             <a:fld id="{FD09FB90-A83B-E248-A89C-4D42C06EC9BD}" type="datetimeFigureOut">
               <a:rPr lang="en-US" smtClean="0"/>
-              <a:t>11/03/15</a:t>
+              <a:t>16/03/15</a:t>
             </a:fld>
             <a:endParaRPr lang="en-US"/>
           </a:p>
@@ -12876,7 +12877,6 @@
               <a:rPr lang="en-GB" sz="1000" dirty="0" smtClean="0"/>
               <a:t>Inf. Spec. </a:t>
             </a:r>
-            <a:endParaRPr lang="en-GB" sz="1000" dirty="0" smtClean="0"/>
           </a:p>
           <a:p>
             <a:pPr algn="ctr"/>
@@ -14849,6 +14849,588 @@
       </p:par>
     </p:tnLst>
   </p:timing>
+</p:sld>
+</file>
+
+<file path=ppt/slides/slide6.xml><?xml version="1.0" encoding="utf-8"?>
+<p:sld xmlns:a="http://schemas.openxmlformats.org/drawingml/2006/main" xmlns:r="http://schemas.openxmlformats.org/officeDocument/2006/relationships" xmlns:p="http://schemas.openxmlformats.org/presentationml/2006/main">
+  <p:cSld>
+    <p:spTree>
+      <p:nvGrpSpPr>
+        <p:cNvPr id="1" name=""/>
+        <p:cNvGrpSpPr/>
+        <p:nvPr/>
+      </p:nvGrpSpPr>
+      <p:grpSpPr>
+        <a:xfrm>
+          <a:off x="0" y="0"/>
+          <a:ext cx="0" cy="0"/>
+          <a:chOff x="0" y="0"/>
+          <a:chExt cx="0" cy="0"/>
+        </a:xfrm>
+      </p:grpSpPr>
+      <p:sp>
+        <p:nvSpPr>
+          <p:cNvPr id="6" name="Rectángulo 5"/>
+          <p:cNvSpPr/>
+          <p:nvPr/>
+        </p:nvSpPr>
+        <p:spPr>
+          <a:xfrm>
+            <a:off x="971600" y="1268760"/>
+            <a:ext cx="1937670" cy="576064"/>
+          </a:xfrm>
+          <a:prstGeom prst="rect">
+            <a:avLst/>
+          </a:prstGeom>
+        </p:spPr>
+        <p:style>
+          <a:lnRef idx="2">
+            <a:schemeClr val="dk1"/>
+          </a:lnRef>
+          <a:fillRef idx="1">
+            <a:schemeClr val="lt1"/>
+          </a:fillRef>
+          <a:effectRef idx="0">
+            <a:schemeClr val="dk1"/>
+          </a:effectRef>
+          <a:fontRef idx="minor">
+            <a:schemeClr val="dk1"/>
+          </a:fontRef>
+        </p:style>
+        <p:txBody>
+          <a:bodyPr rtlCol="0" anchor="ctr"/>
+          <a:lstStyle/>
+          <a:p>
+            <a:pPr algn="ctr"/>
+            <a:r>
+              <a:rPr lang="en-GB" dirty="0" smtClean="0"/>
+              <a:t>Software Stack</a:t>
+            </a:r>
+            <a:endParaRPr lang="en-GB" dirty="0"/>
+          </a:p>
+        </p:txBody>
+      </p:sp>
+      <p:sp>
+        <p:nvSpPr>
+          <p:cNvPr id="7" name="Rectángulo 6"/>
+          <p:cNvSpPr/>
+          <p:nvPr/>
+        </p:nvSpPr>
+        <p:spPr>
+          <a:xfrm>
+            <a:off x="4842996" y="1280468"/>
+            <a:ext cx="2448272" cy="576064"/>
+          </a:xfrm>
+          <a:prstGeom prst="rect">
+            <a:avLst/>
+          </a:prstGeom>
+        </p:spPr>
+        <p:style>
+          <a:lnRef idx="2">
+            <a:schemeClr val="dk1"/>
+          </a:lnRef>
+          <a:fillRef idx="1">
+            <a:schemeClr val="lt1"/>
+          </a:fillRef>
+          <a:effectRef idx="0">
+            <a:schemeClr val="dk1"/>
+          </a:effectRef>
+          <a:fontRef idx="minor">
+            <a:schemeClr val="dk1"/>
+          </a:fontRef>
+        </p:style>
+        <p:txBody>
+          <a:bodyPr rtlCol="0" anchor="ctr"/>
+          <a:lstStyle/>
+          <a:p>
+            <a:pPr algn="ctr"/>
+            <a:r>
+              <a:rPr lang="en-GB" dirty="0" smtClean="0"/>
+              <a:t>Software Component</a:t>
+            </a:r>
+            <a:endParaRPr lang="en-GB" dirty="0"/>
+          </a:p>
+        </p:txBody>
+      </p:sp>
+      <p:sp>
+        <p:nvSpPr>
+          <p:cNvPr id="8" name="Rectángulo 7"/>
+          <p:cNvSpPr/>
+          <p:nvPr/>
+        </p:nvSpPr>
+        <p:spPr>
+          <a:xfrm>
+            <a:off x="1043608" y="2708920"/>
+            <a:ext cx="2448272" cy="576064"/>
+          </a:xfrm>
+          <a:prstGeom prst="rect">
+            <a:avLst/>
+          </a:prstGeom>
+        </p:spPr>
+        <p:style>
+          <a:lnRef idx="2">
+            <a:schemeClr val="dk1"/>
+          </a:lnRef>
+          <a:fillRef idx="1">
+            <a:schemeClr val="lt1"/>
+          </a:fillRef>
+          <a:effectRef idx="0">
+            <a:schemeClr val="dk1"/>
+          </a:effectRef>
+          <a:fontRef idx="minor">
+            <a:schemeClr val="dk1"/>
+          </a:fontRef>
+        </p:style>
+        <p:txBody>
+          <a:bodyPr rtlCol="0" anchor="ctr"/>
+          <a:lstStyle/>
+          <a:p>
+            <a:pPr algn="ctr"/>
+            <a:r>
+              <a:rPr lang="en-GB" dirty="0" smtClean="0"/>
+              <a:t>Deployment Step</a:t>
+            </a:r>
+            <a:endParaRPr lang="en-GB" dirty="0"/>
+          </a:p>
+        </p:txBody>
+      </p:sp>
+      <p:sp>
+        <p:nvSpPr>
+          <p:cNvPr id="9" name="Rectángulo 8"/>
+          <p:cNvSpPr/>
+          <p:nvPr/>
+        </p:nvSpPr>
+        <p:spPr>
+          <a:xfrm>
+            <a:off x="4854952" y="2708920"/>
+            <a:ext cx="2448272" cy="576064"/>
+          </a:xfrm>
+          <a:prstGeom prst="rect">
+            <a:avLst/>
+          </a:prstGeom>
+        </p:spPr>
+        <p:style>
+          <a:lnRef idx="2">
+            <a:schemeClr val="dk1"/>
+          </a:lnRef>
+          <a:fillRef idx="1">
+            <a:schemeClr val="lt1"/>
+          </a:fillRef>
+          <a:effectRef idx="0">
+            <a:schemeClr val="dk1"/>
+          </a:effectRef>
+          <a:fontRef idx="minor">
+            <a:schemeClr val="dk1"/>
+          </a:fontRef>
+        </p:style>
+        <p:txBody>
+          <a:bodyPr rtlCol="0" anchor="ctr"/>
+          <a:lstStyle/>
+          <a:p>
+            <a:pPr algn="ctr"/>
+            <a:r>
+              <a:rPr lang="en-GB" dirty="0" smtClean="0"/>
+              <a:t>Deployment Plan</a:t>
+            </a:r>
+            <a:endParaRPr lang="en-GB" dirty="0"/>
+          </a:p>
+        </p:txBody>
+      </p:sp>
+      <p:cxnSp>
+        <p:nvCxnSpPr>
+          <p:cNvPr id="11" name="Conector recto 10"/>
+          <p:cNvCxnSpPr>
+            <a:stCxn id="6" idx="3"/>
+            <a:endCxn id="7" idx="1"/>
+          </p:cNvCxnSpPr>
+          <p:nvPr/>
+        </p:nvCxnSpPr>
+        <p:spPr>
+          <a:xfrm>
+            <a:off x="2909270" y="1556792"/>
+            <a:ext cx="1933726" cy="11708"/>
+          </a:xfrm>
+          <a:prstGeom prst="line">
+            <a:avLst/>
+          </a:prstGeom>
+          <a:ln>
+            <a:headEnd type="none"/>
+            <a:tailEnd type="triangle"/>
+          </a:ln>
+          <a:effectLst/>
+        </p:spPr>
+        <p:style>
+          <a:lnRef idx="2">
+            <a:schemeClr val="dk1"/>
+          </a:lnRef>
+          <a:fillRef idx="0">
+            <a:schemeClr val="dk1"/>
+          </a:fillRef>
+          <a:effectRef idx="1">
+            <a:schemeClr val="dk1"/>
+          </a:effectRef>
+          <a:fontRef idx="minor">
+            <a:schemeClr val="tx1"/>
+          </a:fontRef>
+        </p:style>
+      </p:cxnSp>
+      <p:cxnSp>
+        <p:nvCxnSpPr>
+          <p:cNvPr id="12" name="Conector recto 11"/>
+          <p:cNvCxnSpPr>
+            <a:stCxn id="9" idx="0"/>
+            <a:endCxn id="7" idx="2"/>
+          </p:cNvCxnSpPr>
+          <p:nvPr/>
+        </p:nvCxnSpPr>
+        <p:spPr>
+          <a:xfrm flipH="1" flipV="1">
+            <a:off x="6067132" y="1856532"/>
+            <a:ext cx="11956" cy="852388"/>
+          </a:xfrm>
+          <a:prstGeom prst="line">
+            <a:avLst/>
+          </a:prstGeom>
+          <a:ln>
+            <a:headEnd type="none"/>
+            <a:tailEnd type="triangle"/>
+          </a:ln>
+          <a:effectLst/>
+        </p:spPr>
+        <p:style>
+          <a:lnRef idx="2">
+            <a:schemeClr val="dk1"/>
+          </a:lnRef>
+          <a:fillRef idx="0">
+            <a:schemeClr val="dk1"/>
+          </a:fillRef>
+          <a:effectRef idx="1">
+            <a:schemeClr val="dk1"/>
+          </a:effectRef>
+          <a:fontRef idx="minor">
+            <a:schemeClr val="tx1"/>
+          </a:fontRef>
+        </p:style>
+      </p:cxnSp>
+      <p:cxnSp>
+        <p:nvCxnSpPr>
+          <p:cNvPr id="15" name="Conector recto 14"/>
+          <p:cNvCxnSpPr>
+            <a:stCxn id="8" idx="3"/>
+            <a:endCxn id="9" idx="1"/>
+          </p:cNvCxnSpPr>
+          <p:nvPr/>
+        </p:nvCxnSpPr>
+        <p:spPr>
+          <a:xfrm>
+            <a:off x="3491880" y="2996952"/>
+            <a:ext cx="1363072" cy="0"/>
+          </a:xfrm>
+          <a:prstGeom prst="line">
+            <a:avLst/>
+          </a:prstGeom>
+          <a:ln>
+            <a:headEnd type="none"/>
+            <a:tailEnd type="triangle"/>
+          </a:ln>
+          <a:effectLst/>
+        </p:spPr>
+        <p:style>
+          <a:lnRef idx="2">
+            <a:schemeClr val="dk1"/>
+          </a:lnRef>
+          <a:fillRef idx="0">
+            <a:schemeClr val="dk1"/>
+          </a:fillRef>
+          <a:effectRef idx="1">
+            <a:schemeClr val="dk1"/>
+          </a:effectRef>
+          <a:fontRef idx="minor">
+            <a:schemeClr val="tx1"/>
+          </a:fontRef>
+        </p:style>
+      </p:cxnSp>
+      <p:sp>
+        <p:nvSpPr>
+          <p:cNvPr id="19" name="CuadroTexto 18"/>
+          <p:cNvSpPr txBox="1"/>
+          <p:nvPr/>
+        </p:nvSpPr>
+        <p:spPr>
+          <a:xfrm>
+            <a:off x="2909270" y="1223517"/>
+            <a:ext cx="288032" cy="307777"/>
+          </a:xfrm>
+          <a:prstGeom prst="rect">
+            <a:avLst/>
+          </a:prstGeom>
+          <a:noFill/>
+        </p:spPr>
+        <p:txBody>
+          <a:bodyPr wrap="square" rtlCol="0">
+            <a:spAutoFit/>
+          </a:bodyPr>
+          <a:lstStyle/>
+          <a:p>
+            <a:r>
+              <a:rPr lang="en-GB" sz="1400" dirty="0" smtClean="0"/>
+              <a:t>1</a:t>
+            </a:r>
+            <a:endParaRPr lang="en-GB" sz="1400" dirty="0"/>
+          </a:p>
+        </p:txBody>
+      </p:sp>
+      <p:sp>
+        <p:nvSpPr>
+          <p:cNvPr id="20" name="CuadroTexto 19"/>
+          <p:cNvSpPr txBox="1"/>
+          <p:nvPr/>
+        </p:nvSpPr>
+        <p:spPr>
+          <a:xfrm>
+            <a:off x="6079088" y="1856532"/>
+            <a:ext cx="288032" cy="307777"/>
+          </a:xfrm>
+          <a:prstGeom prst="rect">
+            <a:avLst/>
+          </a:prstGeom>
+          <a:noFill/>
+        </p:spPr>
+        <p:txBody>
+          <a:bodyPr wrap="square" rtlCol="0">
+            <a:spAutoFit/>
+          </a:bodyPr>
+          <a:lstStyle/>
+          <a:p>
+            <a:r>
+              <a:rPr lang="en-GB" sz="1400" dirty="0" smtClean="0"/>
+              <a:t>1</a:t>
+            </a:r>
+            <a:endParaRPr lang="en-GB" sz="1400" dirty="0"/>
+          </a:p>
+        </p:txBody>
+      </p:sp>
+      <p:sp>
+        <p:nvSpPr>
+          <p:cNvPr id="21" name="CuadroTexto 20"/>
+          <p:cNvSpPr txBox="1"/>
+          <p:nvPr/>
+        </p:nvSpPr>
+        <p:spPr>
+          <a:xfrm>
+            <a:off x="4153396" y="2708920"/>
+            <a:ext cx="288032" cy="307777"/>
+          </a:xfrm>
+          <a:prstGeom prst="rect">
+            <a:avLst/>
+          </a:prstGeom>
+          <a:noFill/>
+        </p:spPr>
+        <p:txBody>
+          <a:bodyPr wrap="square" rtlCol="0">
+            <a:spAutoFit/>
+          </a:bodyPr>
+          <a:lstStyle/>
+          <a:p>
+            <a:r>
+              <a:rPr lang="en-GB" sz="1400" dirty="0" smtClean="0"/>
+              <a:t>1</a:t>
+            </a:r>
+            <a:endParaRPr lang="en-GB" sz="1400" dirty="0"/>
+          </a:p>
+        </p:txBody>
+      </p:sp>
+      <p:sp>
+        <p:nvSpPr>
+          <p:cNvPr id="22" name="CuadroTexto 21"/>
+          <p:cNvSpPr txBox="1"/>
+          <p:nvPr/>
+        </p:nvSpPr>
+        <p:spPr>
+          <a:xfrm>
+            <a:off x="4139952" y="1228690"/>
+            <a:ext cx="288032" cy="400110"/>
+          </a:xfrm>
+          <a:prstGeom prst="rect">
+            <a:avLst/>
+          </a:prstGeom>
+          <a:noFill/>
+        </p:spPr>
+        <p:txBody>
+          <a:bodyPr wrap="square" rtlCol="0">
+            <a:spAutoFit/>
+          </a:bodyPr>
+          <a:lstStyle/>
+          <a:p>
+            <a:r>
+              <a:rPr lang="en-GB" sz="2000" dirty="0"/>
+              <a:t>*</a:t>
+            </a:r>
+            <a:endParaRPr lang="en-GB" sz="2000" dirty="0"/>
+          </a:p>
+        </p:txBody>
+      </p:sp>
+      <p:sp>
+        <p:nvSpPr>
+          <p:cNvPr id="23" name="CuadroTexto 22"/>
+          <p:cNvSpPr txBox="1"/>
+          <p:nvPr/>
+        </p:nvSpPr>
+        <p:spPr>
+          <a:xfrm>
+            <a:off x="6079088" y="2420888"/>
+            <a:ext cx="288032" cy="400110"/>
+          </a:xfrm>
+          <a:prstGeom prst="rect">
+            <a:avLst/>
+          </a:prstGeom>
+          <a:noFill/>
+        </p:spPr>
+        <p:txBody>
+          <a:bodyPr wrap="square" rtlCol="0">
+            <a:spAutoFit/>
+          </a:bodyPr>
+          <a:lstStyle/>
+          <a:p>
+            <a:r>
+              <a:rPr lang="en-GB" sz="2000" dirty="0"/>
+              <a:t>*</a:t>
+            </a:r>
+            <a:endParaRPr lang="en-GB" sz="2000" dirty="0"/>
+          </a:p>
+        </p:txBody>
+      </p:sp>
+      <p:sp>
+        <p:nvSpPr>
+          <p:cNvPr id="24" name="CuadroTexto 23"/>
+          <p:cNvSpPr txBox="1"/>
+          <p:nvPr/>
+        </p:nvSpPr>
+        <p:spPr>
+          <a:xfrm>
+            <a:off x="3471416" y="2708920"/>
+            <a:ext cx="288032" cy="400110"/>
+          </a:xfrm>
+          <a:prstGeom prst="rect">
+            <a:avLst/>
+          </a:prstGeom>
+          <a:noFill/>
+        </p:spPr>
+        <p:txBody>
+          <a:bodyPr wrap="square" rtlCol="0">
+            <a:spAutoFit/>
+          </a:bodyPr>
+          <a:lstStyle/>
+          <a:p>
+            <a:r>
+              <a:rPr lang="en-GB" sz="2000" dirty="0"/>
+              <a:t>*</a:t>
+            </a:r>
+            <a:endParaRPr lang="en-GB" sz="2000" dirty="0"/>
+          </a:p>
+        </p:txBody>
+      </p:sp>
+      <p:sp>
+        <p:nvSpPr>
+          <p:cNvPr id="25" name="CuadroTexto 24"/>
+          <p:cNvSpPr txBox="1"/>
+          <p:nvPr/>
+        </p:nvSpPr>
+        <p:spPr>
+          <a:xfrm>
+            <a:off x="3207248" y="1590908"/>
+            <a:ext cx="1508768" cy="253916"/>
+          </a:xfrm>
+          <a:prstGeom prst="rect">
+            <a:avLst/>
+          </a:prstGeom>
+          <a:noFill/>
+        </p:spPr>
+        <p:txBody>
+          <a:bodyPr wrap="none" rtlCol="0">
+            <a:spAutoFit/>
+          </a:bodyPr>
+          <a:lstStyle/>
+          <a:p>
+            <a:r>
+              <a:rPr lang="en-GB" sz="1050" dirty="0" err="1"/>
+              <a:t>hasSoftwareComponent</a:t>
+            </a:r>
+            <a:endParaRPr lang="en-GB" sz="1050" dirty="0"/>
+          </a:p>
+        </p:txBody>
+      </p:sp>
+      <p:sp>
+        <p:nvSpPr>
+          <p:cNvPr id="26" name="CuadroTexto 25"/>
+          <p:cNvSpPr txBox="1"/>
+          <p:nvPr/>
+        </p:nvSpPr>
+        <p:spPr>
+          <a:xfrm>
+            <a:off x="3534028" y="2996952"/>
+            <a:ext cx="1326004" cy="253916"/>
+          </a:xfrm>
+          <a:prstGeom prst="rect">
+            <a:avLst/>
+          </a:prstGeom>
+          <a:noFill/>
+        </p:spPr>
+        <p:txBody>
+          <a:bodyPr wrap="none" rtlCol="0">
+            <a:spAutoFit/>
+          </a:bodyPr>
+          <a:lstStyle/>
+          <a:p>
+            <a:r>
+              <a:rPr lang="en-GB" sz="1050" dirty="0" err="1"/>
+              <a:t>isDeploymentStepOf</a:t>
+            </a:r>
+            <a:endParaRPr lang="en-GB" sz="1050" dirty="0"/>
+          </a:p>
+        </p:txBody>
+      </p:sp>
+      <p:sp>
+        <p:nvSpPr>
+          <p:cNvPr id="27" name="CuadroTexto 26"/>
+          <p:cNvSpPr txBox="1"/>
+          <p:nvPr/>
+        </p:nvSpPr>
+        <p:spPr>
+          <a:xfrm>
+            <a:off x="6139140" y="2167419"/>
+            <a:ext cx="1313180" cy="253916"/>
+          </a:xfrm>
+          <a:prstGeom prst="rect">
+            <a:avLst/>
+          </a:prstGeom>
+          <a:noFill/>
+        </p:spPr>
+        <p:txBody>
+          <a:bodyPr wrap="none" rtlCol="0">
+            <a:spAutoFit/>
+          </a:bodyPr>
+          <a:lstStyle/>
+          <a:p>
+            <a:r>
+              <a:rPr lang="en-GB" sz="1050" dirty="0" err="1"/>
+              <a:t>isDeploymentPlanOf</a:t>
+            </a:r>
+            <a:endParaRPr lang="en-GB" sz="1050" dirty="0"/>
+          </a:p>
+        </p:txBody>
+      </p:sp>
+    </p:spTree>
+    <p:extLst>
+      <p:ext uri="{BB962C8B-B14F-4D97-AF65-F5344CB8AC3E}">
+        <p14:creationId xmlns:p14="http://schemas.microsoft.com/office/powerpoint/2010/main" val="209692658"/>
+      </p:ext>
+    </p:extLst>
+  </p:cSld>
+  <p:clrMapOvr>
+    <a:masterClrMapping/>
+  </p:clrMapOvr>
 </p:sld>
 </file>
 

</xml_diff>

<commit_message>
new abstract proposal and revision of paper
</commit_message>
<xml_diff>
--- a/data/Diagrams.pptx
+++ b/data/Diagrams.pptx
@@ -3390,11 +3390,11 @@
           <a:p>
             <a:pPr algn="ctr"/>
             <a:r>
-              <a:rPr lang="en-US" sz="1500" dirty="0" err="1" smtClean="0">
+              <a:rPr lang="en-US" sz="1500" dirty="0" err="1">
                 <a:latin typeface="Courier New"/>
                 <a:cs typeface="Courier New"/>
               </a:rPr>
-              <a:t>requiresHardware</a:t>
+              <a:t>hasHardwareSpecs</a:t>
             </a:r>
             <a:endParaRPr lang="en-US" sz="1500" dirty="0">
               <a:latin typeface="Courier New"/>

</xml_diff>